<commit_message>
feat: melhorias nos textos
</commit_message>
<xml_diff>
--- a/docs/treinamento-estagiarios-five.pptx
+++ b/docs/treinamento-estagiarios-five.pptx
@@ -11,9 +11,9 @@
     <p:sldId id="288" r:id="rId2"/>
     <p:sldId id="267" r:id="rId3"/>
     <p:sldId id="270" r:id="rId4"/>
-    <p:sldId id="271" r:id="rId5"/>
-    <p:sldId id="272" r:id="rId6"/>
-    <p:sldId id="273" r:id="rId7"/>
+    <p:sldId id="272" r:id="rId5"/>
+    <p:sldId id="273" r:id="rId6"/>
+    <p:sldId id="298" r:id="rId7"/>
     <p:sldId id="274" r:id="rId8"/>
     <p:sldId id="290" r:id="rId9"/>
     <p:sldId id="275" r:id="rId10"/>
@@ -3376,134 +3376,6 @@
               <a:buFont typeface="+mj-lt"/>
               <a:buAutoNum type="arabicPeriod"/>
             </a:pPr>
-            <a:r>
-              <a:rPr lang="pt-BR" sz="1200" b="1" i="0" dirty="0">
-                <a:solidFill>
-                  <a:srgbClr val="575756"/>
-                </a:solidFill>
-                <a:effectLst/>
-                <a:latin typeface="Asap" panose="00000500000000000000"/>
-              </a:rPr>
-              <a:t>S — Single </a:t>
-            </a:r>
-            <a:r>
-              <a:rPr lang="pt-BR" sz="1200" b="1" i="0" dirty="0" err="1">
-                <a:solidFill>
-                  <a:srgbClr val="575756"/>
-                </a:solidFill>
-                <a:effectLst/>
-                <a:latin typeface="Asap" panose="00000500000000000000"/>
-              </a:rPr>
-              <a:t>Responsiblity</a:t>
-            </a:r>
-            <a:r>
-              <a:rPr lang="pt-BR" sz="1200" b="1" i="0" dirty="0">
-                <a:solidFill>
-                  <a:srgbClr val="575756"/>
-                </a:solidFill>
-                <a:effectLst/>
-                <a:latin typeface="Asap" panose="00000500000000000000"/>
-              </a:rPr>
-              <a:t> </a:t>
-            </a:r>
-            <a:r>
-              <a:rPr lang="pt-BR" sz="1200" b="1" i="0" dirty="0" err="1">
-                <a:solidFill>
-                  <a:srgbClr val="575756"/>
-                </a:solidFill>
-                <a:effectLst/>
-                <a:latin typeface="Asap" panose="00000500000000000000"/>
-              </a:rPr>
-              <a:t>Principle</a:t>
-            </a:r>
-            <a:r>
-              <a:rPr lang="pt-BR" sz="1200" b="1" i="0" dirty="0">
-                <a:solidFill>
-                  <a:srgbClr val="575756"/>
-                </a:solidFill>
-                <a:effectLst/>
-                <a:latin typeface="Asap" panose="00000500000000000000"/>
-              </a:rPr>
-              <a:t> </a:t>
-            </a:r>
-            <a:r>
-              <a:rPr lang="pt-BR" sz="1200" b="0" i="0" dirty="0">
-                <a:solidFill>
-                  <a:srgbClr val="575756"/>
-                </a:solidFill>
-                <a:effectLst/>
-                <a:latin typeface="Asap" panose="00000500000000000000"/>
-              </a:rPr>
-              <a:t>(Princípio da responsabilidade única)</a:t>
-            </a:r>
-          </a:p>
-          <a:p>
-            <a:pPr marL="1257300" lvl="2" indent="-342900" algn="just">
-              <a:lnSpc>
-                <a:spcPct val="100000"/>
-              </a:lnSpc>
-              <a:buFont typeface="Arial" panose="020B0604020202020204" pitchFamily="34" charset="0"/>
-              <a:buChar char="•"/>
-            </a:pPr>
-            <a:r>
-              <a:rPr lang="pt-BR" b="0" i="1" dirty="0">
-                <a:solidFill>
-                  <a:srgbClr val="292929"/>
-                </a:solidFill>
-                <a:effectLst/>
-                <a:latin typeface="source-serif-pro"/>
-              </a:rPr>
-              <a:t>“Uma classe deve ter apenas um motivo para mudar</a:t>
-            </a:r>
-            <a:r>
-              <a:rPr lang="pt-BR" b="0" i="0" dirty="0">
-                <a:solidFill>
-                  <a:srgbClr val="575756"/>
-                </a:solidFill>
-                <a:effectLst/>
-                <a:latin typeface="Asap" panose="00000500000000000000"/>
-              </a:rPr>
-              <a:t>”.</a:t>
-            </a:r>
-          </a:p>
-          <a:p>
-            <a:pPr marL="1257300" lvl="2" indent="-342900" algn="just">
-              <a:lnSpc>
-                <a:spcPct val="100000"/>
-              </a:lnSpc>
-              <a:buFont typeface="Arial" panose="020B0604020202020204" pitchFamily="34" charset="0"/>
-              <a:buChar char="•"/>
-            </a:pPr>
-            <a:r>
-              <a:rPr lang="pt-BR" b="0" i="0" dirty="0">
-                <a:solidFill>
-                  <a:srgbClr val="292929"/>
-                </a:solidFill>
-                <a:effectLst/>
-                <a:latin typeface="source-serif-pro"/>
-              </a:rPr>
-              <a:t>Basicamente, esse princípio trata especificamente a </a:t>
-            </a:r>
-            <a:r>
-              <a:rPr lang="pt-BR" b="1" i="0" dirty="0">
-                <a:solidFill>
-                  <a:srgbClr val="292929"/>
-                </a:solidFill>
-                <a:effectLst/>
-                <a:latin typeface="source-serif-pro"/>
-              </a:rPr>
-              <a:t>coesão</a:t>
-            </a:r>
-            <a:r>
-              <a:rPr lang="pt-BR" b="0" i="0" dirty="0">
-                <a:solidFill>
-                  <a:srgbClr val="292929"/>
-                </a:solidFill>
-                <a:effectLst/>
-                <a:latin typeface="source-serif-pro"/>
-              </a:rPr>
-              <a:t>. A coesão é definida como a afinidade funcional dos elementos de um módulo. Se refere ao relacionamento que os membros desse módulo possuem, se possuem uma relação mais direta e importante. Dessa forma, quanto mais bem definido o que sua classe faz, mais coesa ela é.</a:t>
-            </a:r>
             <a:endParaRPr lang="pt-BR" sz="1200" b="0" i="0" dirty="0">
               <a:solidFill>
                 <a:srgbClr val="575756"/>
@@ -3528,7 +3400,7 @@
                 <a:effectLst/>
                 <a:latin typeface="Asap" panose="00000500000000000000"/>
               </a:rPr>
-              <a:t>O — Open-</a:t>
+              <a:t>S — Single </a:t>
             </a:r>
             <a:r>
               <a:rPr lang="pt-BR" sz="1200" b="1" i="0" dirty="0" err="1">
@@ -3538,7 +3410,7 @@
                 <a:effectLst/>
                 <a:latin typeface="Asap" panose="00000500000000000000"/>
               </a:rPr>
-              <a:t>Closed</a:t>
+              <a:t>Responsiblity</a:t>
             </a:r>
             <a:r>
               <a:rPr lang="pt-BR" sz="1200" b="1" i="0" dirty="0">
@@ -3578,11 +3450,11 @@
                 <a:effectLst/>
                 <a:latin typeface="Asap" panose="00000500000000000000"/>
               </a:rPr>
-              <a:t>(Princípio aberto-fechado)</a:t>
-            </a:r>
-          </a:p>
-          <a:p>
-            <a:pPr marL="800100" lvl="1" indent="-342900" algn="just">
+              <a:t>(Princípio da responsabilidade única)</a:t>
+            </a:r>
+          </a:p>
+          <a:p>
+            <a:pPr marL="1257300" lvl="2" indent="-342900" algn="just">
               <a:lnSpc>
                 <a:spcPct val="100000"/>
               </a:lnSpc>
@@ -3597,11 +3469,21 @@
                 <a:effectLst/>
                 <a:latin typeface="source-serif-pro"/>
               </a:rPr>
-              <a:t>“classes, módulos, funções etc. devem ser abertas para ampliação, mas fechadas para modificação”.</a:t>
-            </a:r>
-          </a:p>
-          <a:p>
-            <a:pPr marL="800100" lvl="1" indent="-342900" algn="just">
+              <a:t>“Uma classe deve ter apenas um motivo para mudar</a:t>
+            </a:r>
+            <a:r>
+              <a:rPr lang="pt-BR" b="0" i="0" dirty="0">
+                <a:solidFill>
+                  <a:srgbClr val="575756"/>
+                </a:solidFill>
+                <a:effectLst/>
+                <a:latin typeface="Asap" panose="00000500000000000000"/>
+              </a:rPr>
+              <a:t>”.</a:t>
+            </a:r>
+          </a:p>
+          <a:p>
+            <a:pPr marL="1257300" lvl="2" indent="-342900" algn="just">
               <a:lnSpc>
                 <a:spcPct val="100000"/>
               </a:lnSpc>
@@ -3616,17 +3498,17 @@
                 <a:effectLst/>
                 <a:latin typeface="source-serif-pro"/>
               </a:rPr>
-              <a:t>De forma mais detalhada,</a:t>
-            </a:r>
-            <a:r>
-              <a:rPr lang="pt-BR" b="0" i="1" dirty="0">
+              <a:t>Basicamente, esse princípio trata especificamente a </a:t>
+            </a:r>
+            <a:r>
+              <a:rPr lang="pt-BR" b="1" i="0" dirty="0">
                 <a:solidFill>
                   <a:srgbClr val="292929"/>
                 </a:solidFill>
                 <a:effectLst/>
                 <a:latin typeface="source-serif-pro"/>
               </a:rPr>
-              <a:t> </a:t>
+              <a:t>coesão</a:t>
             </a:r>
             <a:r>
               <a:rPr lang="pt-BR" b="0" i="0" dirty="0">
@@ -3636,87 +3518,7 @@
                 <a:effectLst/>
                 <a:latin typeface="source-serif-pro"/>
               </a:rPr>
-              <a:t>diz que podemos estender o comportamento de uma classe, quando for necessário,</a:t>
-            </a:r>
-            <a:r>
-              <a:rPr lang="pt-BR" b="0" i="1" dirty="0">
-                <a:solidFill>
-                  <a:srgbClr val="292929"/>
-                </a:solidFill>
-                <a:effectLst/>
-                <a:latin typeface="source-serif-pro"/>
-              </a:rPr>
-              <a:t> </a:t>
-            </a:r>
-            <a:r>
-              <a:rPr lang="pt-BR" b="0" i="0" dirty="0">
-                <a:solidFill>
-                  <a:srgbClr val="292929"/>
-                </a:solidFill>
-                <a:effectLst/>
-                <a:latin typeface="source-serif-pro"/>
-              </a:rPr>
-              <a:t>por meio de </a:t>
-            </a:r>
-            <a:r>
-              <a:rPr lang="pt-BR" b="1" i="0" dirty="0">
-                <a:solidFill>
-                  <a:srgbClr val="292929"/>
-                </a:solidFill>
-                <a:effectLst/>
-                <a:latin typeface="source-serif-pro"/>
-              </a:rPr>
-              <a:t>herança</a:t>
-            </a:r>
-            <a:r>
-              <a:rPr lang="pt-BR" b="0" i="0" dirty="0">
-                <a:solidFill>
-                  <a:srgbClr val="292929"/>
-                </a:solidFill>
-                <a:effectLst/>
-                <a:latin typeface="source-serif-pro"/>
-              </a:rPr>
-              <a:t>, </a:t>
-            </a:r>
-            <a:r>
-              <a:rPr lang="pt-BR" b="1" i="0" dirty="0">
-                <a:solidFill>
-                  <a:srgbClr val="292929"/>
-                </a:solidFill>
-                <a:effectLst/>
-                <a:latin typeface="source-serif-pro"/>
-              </a:rPr>
-              <a:t>interface </a:t>
-            </a:r>
-            <a:r>
-              <a:rPr lang="pt-BR" b="0" i="0" dirty="0">
-                <a:solidFill>
-                  <a:srgbClr val="292929"/>
-                </a:solidFill>
-                <a:effectLst/>
-                <a:latin typeface="source-serif-pro"/>
-              </a:rPr>
-              <a:t>e </a:t>
-            </a:r>
-            <a:r>
-              <a:rPr lang="pt-BR" b="1" i="0" dirty="0">
-                <a:solidFill>
-                  <a:srgbClr val="292929"/>
-                </a:solidFill>
-                <a:effectLst/>
-                <a:latin typeface="source-serif-pro"/>
-              </a:rPr>
-              <a:t>composição</a:t>
-            </a:r>
-            <a:r>
-              <a:rPr lang="pt-BR" b="0" i="0" dirty="0">
-                <a:solidFill>
-                  <a:srgbClr val="292929"/>
-                </a:solidFill>
-                <a:effectLst/>
-                <a:latin typeface="source-serif-pro"/>
-              </a:rPr>
-              <a:t>, mas não podemos permitir a abertura dessa classe para fazer pequenas modificações.</a:t>
+              <a:t>. A coesão é definida como a afinidade funcional dos elementos de um módulo. Se refere ao relacionamento que os membros desse módulo possuem, se possuem uma relação mais direta e importante. Dessa forma, quanto mais bem definido o que sua classe faz, mais coesa ela é.</a:t>
             </a:r>
             <a:endParaRPr lang="pt-BR" sz="1200" b="0" i="0" dirty="0">
               <a:solidFill>
@@ -3742,7 +3544,7 @@
                 <a:effectLst/>
                 <a:latin typeface="Asap" panose="00000500000000000000"/>
               </a:rPr>
-              <a:t>L — </a:t>
+              <a:t>O — Open-</a:t>
             </a:r>
             <a:r>
               <a:rPr lang="pt-BR" sz="1200" b="1" i="0" dirty="0" err="1">
@@ -3752,7 +3554,7 @@
                 <a:effectLst/>
                 <a:latin typeface="Asap" panose="00000500000000000000"/>
               </a:rPr>
-              <a:t>Liskov</a:t>
+              <a:t>Closed</a:t>
             </a:r>
             <a:r>
               <a:rPr lang="pt-BR" sz="1200" b="1" i="0" dirty="0">
@@ -3772,7 +3574,7 @@
                 <a:effectLst/>
                 <a:latin typeface="Asap" panose="00000500000000000000"/>
               </a:rPr>
-              <a:t>Substitution</a:t>
+              <a:t>Principle</a:t>
             </a:r>
             <a:r>
               <a:rPr lang="pt-BR" sz="1200" b="1" i="0" dirty="0">
@@ -3782,57 +3584,17 @@
                 <a:effectLst/>
                 <a:latin typeface="Asap" panose="00000500000000000000"/>
               </a:rPr>
-              <a:t> </a:t>
-            </a:r>
-            <a:r>
-              <a:rPr lang="pt-BR" sz="1200" b="1" i="0" dirty="0" err="1">
+              <a:t> </a:t>
+            </a:r>
+            <a:r>
+              <a:rPr lang="pt-BR" sz="1200" b="0" i="0" dirty="0">
                 <a:solidFill>
                   <a:srgbClr val="575756"/>
                 </a:solidFill>
                 <a:effectLst/>
                 <a:latin typeface="Asap" panose="00000500000000000000"/>
               </a:rPr>
-              <a:t>Principle</a:t>
-            </a:r>
-            <a:r>
-              <a:rPr lang="pt-BR" sz="1200" b="1" i="0" dirty="0">
-                <a:solidFill>
-                  <a:srgbClr val="575756"/>
-                </a:solidFill>
-                <a:effectLst/>
-                <a:latin typeface="Asap" panose="00000500000000000000"/>
-              </a:rPr>
-              <a:t> </a:t>
-            </a:r>
-            <a:r>
-              <a:rPr lang="pt-BR" sz="1200" b="0" i="0" dirty="0">
-                <a:solidFill>
-                  <a:srgbClr val="575756"/>
-                </a:solidFill>
-                <a:effectLst/>
-                <a:latin typeface="Asap" panose="00000500000000000000"/>
-              </a:rPr>
-              <a:t>(Princípio da substituição de </a:t>
-            </a:r>
-            <a:r>
-              <a:rPr lang="pt-BR" sz="1200" b="0" i="0" dirty="0" err="1">
-                <a:solidFill>
-                  <a:srgbClr val="575756"/>
-                </a:solidFill>
-                <a:effectLst/>
-                <a:latin typeface="Asap" panose="00000500000000000000"/>
-              </a:rPr>
-              <a:t>Liskov</a:t>
-            </a:r>
-            <a:r>
-              <a:rPr lang="pt-BR" sz="1200" b="0" i="0" dirty="0">
-                <a:solidFill>
-                  <a:srgbClr val="575756"/>
-                </a:solidFill>
-                <a:effectLst/>
-                <a:latin typeface="Asap" panose="00000500000000000000"/>
-              </a:rPr>
-              <a:t>)</a:t>
+              <a:t>(Princípio aberto-fechado)</a:t>
             </a:r>
           </a:p>
           <a:p>
@@ -3851,8 +3613,17 @@
                 <a:effectLst/>
                 <a:latin typeface="source-serif-pro"/>
               </a:rPr>
-              <a:t>“Os subtipos devem ser substituíveis pelos seus tipos base”, </a:t>
-            </a:r>
+              <a:t>“classes, módulos, funções etc. devem ser abertas para ampliação, mas fechadas para modificação”.</a:t>
+            </a:r>
+          </a:p>
+          <a:p>
+            <a:pPr marL="800100" lvl="1" indent="-342900" algn="just">
+              <a:lnSpc>
+                <a:spcPct val="100000"/>
+              </a:lnSpc>
+              <a:buFont typeface="Arial" panose="020B0604020202020204" pitchFamily="34" charset="0"/>
+              <a:buChar char="•"/>
+            </a:pPr>
             <a:r>
               <a:rPr lang="pt-BR" b="0" i="0" dirty="0">
                 <a:solidFill>
@@ -3861,36 +3632,18 @@
                 <a:effectLst/>
                 <a:latin typeface="source-serif-pro"/>
               </a:rPr>
-              <a:t>e que as classes/tipos base podem ser substituídas por qualquer uma das suas subclasses, ponderando sobre os cuidados para usar a herança no seu projeto de software. </a:t>
-            </a:r>
-          </a:p>
-          <a:p>
-            <a:pPr marL="800100" lvl="1" indent="-342900" algn="just">
-              <a:lnSpc>
-                <a:spcPct val="100000"/>
-              </a:lnSpc>
-              <a:buFont typeface="Arial" panose="020B0604020202020204" pitchFamily="34" charset="0"/>
-              <a:buChar char="•"/>
-            </a:pPr>
-            <a:r>
-              <a:rPr lang="pt-BR" b="0" i="0" dirty="0">
+              <a:t>De forma mais detalhada,</a:t>
+            </a:r>
+            <a:r>
+              <a:rPr lang="pt-BR" b="0" i="1" dirty="0">
                 <a:solidFill>
                   <a:srgbClr val="292929"/>
                 </a:solidFill>
                 <a:effectLst/>
                 <a:latin typeface="source-serif-pro"/>
               </a:rPr>
-              <a:t>Mesmo a herança sendo um mecanismo poderoso, ela deve ser utilizada de forma contextualizada e moderada, evitando os casos de classes serem estendidas apenas por possuírem algo em comum.</a:t>
-            </a:r>
-          </a:p>
-          <a:p>
-            <a:pPr marL="800100" lvl="1" indent="-342900" algn="just">
-              <a:lnSpc>
-                <a:spcPct val="100000"/>
-              </a:lnSpc>
-              <a:buFont typeface="Arial" panose="020B0604020202020204" pitchFamily="34" charset="0"/>
-              <a:buChar char="•"/>
-            </a:pPr>
+              <a:t> </a:t>
+            </a:r>
             <a:r>
               <a:rPr lang="pt-BR" b="0" i="0" dirty="0">
                 <a:solidFill>
@@ -3899,47 +3652,87 @@
                 <a:effectLst/>
                 <a:latin typeface="source-serif-pro"/>
               </a:rPr>
-              <a:t>Esse princípio foi descrito pela pesquisadora </a:t>
-            </a:r>
-            <a:r>
-              <a:rPr lang="pt-BR" b="1" i="1" dirty="0">
+              <a:t>diz que podemos estender o comportamento de uma classe, quando for necessário,</a:t>
+            </a:r>
+            <a:r>
+              <a:rPr lang="pt-BR" b="0" i="1" dirty="0">
                 <a:solidFill>
                   <a:srgbClr val="292929"/>
                 </a:solidFill>
                 <a:effectLst/>
                 <a:latin typeface="source-serif-pro"/>
               </a:rPr>
-              <a:t>Barbara </a:t>
-            </a:r>
-            <a:r>
-              <a:rPr lang="pt-BR" b="1" i="1" dirty="0" err="1">
+              <a:t> </a:t>
+            </a:r>
+            <a:r>
+              <a:rPr lang="pt-BR" b="0" i="0" dirty="0">
                 <a:solidFill>
                   <a:srgbClr val="292929"/>
                 </a:solidFill>
                 <a:effectLst/>
                 <a:latin typeface="source-serif-pro"/>
               </a:rPr>
-              <a:t>Liskov</a:t>
-            </a:r>
-            <a:r>
-              <a:rPr lang="pt-BR" b="0" i="0" dirty="0">
+              <a:t>por meio de </a:t>
+            </a:r>
+            <a:r>
+              <a:rPr lang="pt-BR" b="1" i="0" dirty="0">
                 <a:solidFill>
                   <a:srgbClr val="292929"/>
                 </a:solidFill>
                 <a:effectLst/>
                 <a:latin typeface="source-serif-pro"/>
               </a:rPr>
-              <a:t>, em seu artigo de </a:t>
-            </a:r>
-            <a:r>
-              <a:rPr lang="pt-BR" b="1" i="0" dirty="0">
+              <a:t>herança</a:t>
+            </a:r>
+            <a:r>
+              <a:rPr lang="pt-BR" b="0" i="0" dirty="0">
                 <a:solidFill>
                   <a:srgbClr val="292929"/>
                 </a:solidFill>
                 <a:effectLst/>
                 <a:latin typeface="source-serif-pro"/>
               </a:rPr>
-              <a:t>1988</a:t>
+              <a:t>, </a:t>
+            </a:r>
+            <a:r>
+              <a:rPr lang="pt-BR" b="1" i="0" dirty="0">
+                <a:solidFill>
+                  <a:srgbClr val="292929"/>
+                </a:solidFill>
+                <a:effectLst/>
+                <a:latin typeface="source-serif-pro"/>
+              </a:rPr>
+              <a:t>interface </a:t>
+            </a:r>
+            <a:r>
+              <a:rPr lang="pt-BR" b="0" i="0" dirty="0">
+                <a:solidFill>
+                  <a:srgbClr val="292929"/>
+                </a:solidFill>
+                <a:effectLst/>
+                <a:latin typeface="source-serif-pro"/>
+              </a:rPr>
+              <a:t>e </a:t>
+            </a:r>
+            <a:r>
+              <a:rPr lang="pt-BR" b="1" i="0" dirty="0">
+                <a:solidFill>
+                  <a:srgbClr val="292929"/>
+                </a:solidFill>
+                <a:effectLst/>
+                <a:latin typeface="source-serif-pro"/>
+              </a:rPr>
+              <a:t>composição</a:t>
+            </a:r>
+            <a:r>
+              <a:rPr lang="pt-BR" b="0" i="0" dirty="0">
+                <a:solidFill>
+                  <a:srgbClr val="292929"/>
+                </a:solidFill>
+                <a:effectLst/>
+                <a:latin typeface="source-serif-pro"/>
+              </a:rPr>
+              <a:t>, mas não podemos permitir a abertura dessa classe para fazer pequenas modificações.</a:t>
             </a:r>
             <a:endParaRPr lang="pt-BR" sz="1200" b="0" i="0" dirty="0">
               <a:solidFill>
@@ -3965,7 +3758,7 @@
                 <a:effectLst/>
                 <a:latin typeface="Asap" panose="00000500000000000000"/>
               </a:rPr>
-              <a:t>I — Interface </a:t>
+              <a:t>L — </a:t>
             </a:r>
             <a:r>
               <a:rPr lang="pt-BR" sz="1200" b="1" i="0" dirty="0" err="1">
@@ -3975,7 +3768,7 @@
                 <a:effectLst/>
                 <a:latin typeface="Asap" panose="00000500000000000000"/>
               </a:rPr>
-              <a:t>Segregation</a:t>
+              <a:t>Liskov</a:t>
             </a:r>
             <a:r>
               <a:rPr lang="pt-BR" sz="1200" b="1" i="0" dirty="0">
@@ -3995,6 +3788,26 @@
                 <a:effectLst/>
                 <a:latin typeface="Asap" panose="00000500000000000000"/>
               </a:rPr>
+              <a:t>Substitution</a:t>
+            </a:r>
+            <a:r>
+              <a:rPr lang="pt-BR" sz="1200" b="1" i="0" dirty="0">
+                <a:solidFill>
+                  <a:srgbClr val="575756"/>
+                </a:solidFill>
+                <a:effectLst/>
+                <a:latin typeface="Asap" panose="00000500000000000000"/>
+              </a:rPr>
+              <a:t> </a:t>
+            </a:r>
+            <a:r>
+              <a:rPr lang="pt-BR" sz="1200" b="1" i="0" dirty="0" err="1">
+                <a:solidFill>
+                  <a:srgbClr val="575756"/>
+                </a:solidFill>
+                <a:effectLst/>
+                <a:latin typeface="Asap" panose="00000500000000000000"/>
+              </a:rPr>
               <a:t>Principle</a:t>
             </a:r>
             <a:r>
@@ -4015,7 +3828,27 @@
                 <a:effectLst/>
                 <a:latin typeface="Asap" panose="00000500000000000000"/>
               </a:rPr>
-              <a:t>(Princípio da segregação da Interface)</a:t>
+              <a:t>(Princípio da substituição de </a:t>
+            </a:r>
+            <a:r>
+              <a:rPr lang="pt-BR" sz="1200" b="0" i="0" dirty="0" err="1">
+                <a:solidFill>
+                  <a:srgbClr val="575756"/>
+                </a:solidFill>
+                <a:effectLst/>
+                <a:latin typeface="Asap" panose="00000500000000000000"/>
+              </a:rPr>
+              <a:t>Liskov</a:t>
+            </a:r>
+            <a:r>
+              <a:rPr lang="pt-BR" sz="1200" b="0" i="0" dirty="0">
+                <a:solidFill>
+                  <a:srgbClr val="575756"/>
+                </a:solidFill>
+                <a:effectLst/>
+                <a:latin typeface="Asap" panose="00000500000000000000"/>
+              </a:rPr>
+              <a:t>)</a:t>
             </a:r>
           </a:p>
           <a:p>
@@ -4034,7 +3867,7 @@
                 <a:effectLst/>
                 <a:latin typeface="source-serif-pro"/>
               </a:rPr>
-              <a:t>“muitas interfaces específicas são melhores do que uma interface geral” que se </a:t>
+              <a:t>“Os subtipos devem ser substituíveis pelos seus tipos base”, </a:t>
             </a:r>
             <a:r>
               <a:rPr lang="pt-BR" b="0" i="0" dirty="0">
@@ -4044,7 +3877,7 @@
                 <a:effectLst/>
                 <a:latin typeface="source-serif-pro"/>
               </a:rPr>
-              <a:t>trata da coesão em interfaces.</a:t>
+              <a:t>e que as classes/tipos base podem ser substituídas por qualquer uma das suas subclasses, ponderando sobre os cuidados para usar a herança no seu projeto de software. </a:t>
             </a:r>
           </a:p>
           <a:p>
@@ -4063,7 +3896,66 @@
                 <a:effectLst/>
                 <a:latin typeface="source-serif-pro"/>
               </a:rPr>
-              <a:t>Da construção de módulos enxutos, ou seja, com poucos comportamentos. Interfaces que possuem muitos comportamentos são difíceis de manter e evoluir, e devem ser evitadas.</a:t>
+              <a:t>Mesmo a herança sendo um mecanismo poderoso, ela deve ser utilizada de forma contextualizada e moderada, evitando os casos de classes serem estendidas apenas por possuírem algo em comum.</a:t>
+            </a:r>
+          </a:p>
+          <a:p>
+            <a:pPr marL="800100" lvl="1" indent="-342900" algn="just">
+              <a:lnSpc>
+                <a:spcPct val="100000"/>
+              </a:lnSpc>
+              <a:buFont typeface="Arial" panose="020B0604020202020204" pitchFamily="34" charset="0"/>
+              <a:buChar char="•"/>
+            </a:pPr>
+            <a:r>
+              <a:rPr lang="pt-BR" b="0" i="0" dirty="0">
+                <a:solidFill>
+                  <a:srgbClr val="292929"/>
+                </a:solidFill>
+                <a:effectLst/>
+                <a:latin typeface="source-serif-pro"/>
+              </a:rPr>
+              <a:t>Esse princípio foi descrito pela pesquisadora </a:t>
+            </a:r>
+            <a:r>
+              <a:rPr lang="pt-BR" b="1" i="1" dirty="0">
+                <a:solidFill>
+                  <a:srgbClr val="292929"/>
+                </a:solidFill>
+                <a:effectLst/>
+                <a:latin typeface="source-serif-pro"/>
+              </a:rPr>
+              <a:t>Barbara </a:t>
+            </a:r>
+            <a:r>
+              <a:rPr lang="pt-BR" b="1" i="1" dirty="0" err="1">
+                <a:solidFill>
+                  <a:srgbClr val="292929"/>
+                </a:solidFill>
+                <a:effectLst/>
+                <a:latin typeface="source-serif-pro"/>
+              </a:rPr>
+              <a:t>Liskov</a:t>
+            </a:r>
+            <a:r>
+              <a:rPr lang="pt-BR" b="0" i="0" dirty="0">
+                <a:solidFill>
+                  <a:srgbClr val="292929"/>
+                </a:solidFill>
+                <a:effectLst/>
+                <a:latin typeface="source-serif-pro"/>
+              </a:rPr>
+              <a:t>, em seu artigo de </a:t>
+            </a:r>
+            <a:r>
+              <a:rPr lang="pt-BR" b="1" i="0" dirty="0">
+                <a:solidFill>
+                  <a:srgbClr val="292929"/>
+                </a:solidFill>
+                <a:effectLst/>
+                <a:latin typeface="source-serif-pro"/>
+              </a:rPr>
+              <a:t>1988</a:t>
             </a:r>
             <a:endParaRPr lang="pt-BR" sz="1200" b="0" i="0" dirty="0">
               <a:solidFill>
@@ -4089,6 +3981,130 @@
                 <a:effectLst/>
                 <a:latin typeface="Asap" panose="00000500000000000000"/>
               </a:rPr>
+              <a:t>I — Interface </a:t>
+            </a:r>
+            <a:r>
+              <a:rPr lang="pt-BR" sz="1200" b="1" i="0" dirty="0" err="1">
+                <a:solidFill>
+                  <a:srgbClr val="575756"/>
+                </a:solidFill>
+                <a:effectLst/>
+                <a:latin typeface="Asap" panose="00000500000000000000"/>
+              </a:rPr>
+              <a:t>Segregation</a:t>
+            </a:r>
+            <a:r>
+              <a:rPr lang="pt-BR" sz="1200" b="1" i="0" dirty="0">
+                <a:solidFill>
+                  <a:srgbClr val="575756"/>
+                </a:solidFill>
+                <a:effectLst/>
+                <a:latin typeface="Asap" panose="00000500000000000000"/>
+              </a:rPr>
+              <a:t> </a:t>
+            </a:r>
+            <a:r>
+              <a:rPr lang="pt-BR" sz="1200" b="1" i="0" dirty="0" err="1">
+                <a:solidFill>
+                  <a:srgbClr val="575756"/>
+                </a:solidFill>
+                <a:effectLst/>
+                <a:latin typeface="Asap" panose="00000500000000000000"/>
+              </a:rPr>
+              <a:t>Principle</a:t>
+            </a:r>
+            <a:r>
+              <a:rPr lang="pt-BR" sz="1200" b="1" i="0" dirty="0">
+                <a:solidFill>
+                  <a:srgbClr val="575756"/>
+                </a:solidFill>
+                <a:effectLst/>
+                <a:latin typeface="Asap" panose="00000500000000000000"/>
+              </a:rPr>
+              <a:t> </a:t>
+            </a:r>
+            <a:r>
+              <a:rPr lang="pt-BR" sz="1200" b="0" i="0" dirty="0">
+                <a:solidFill>
+                  <a:srgbClr val="575756"/>
+                </a:solidFill>
+                <a:effectLst/>
+                <a:latin typeface="Asap" panose="00000500000000000000"/>
+              </a:rPr>
+              <a:t>(Princípio da segregação da Interface)</a:t>
+            </a:r>
+          </a:p>
+          <a:p>
+            <a:pPr marL="800100" lvl="1" indent="-342900" algn="just">
+              <a:lnSpc>
+                <a:spcPct val="100000"/>
+              </a:lnSpc>
+              <a:buFont typeface="Arial" panose="020B0604020202020204" pitchFamily="34" charset="0"/>
+              <a:buChar char="•"/>
+            </a:pPr>
+            <a:r>
+              <a:rPr lang="pt-BR" b="0" i="1" dirty="0">
+                <a:solidFill>
+                  <a:srgbClr val="292929"/>
+                </a:solidFill>
+                <a:effectLst/>
+                <a:latin typeface="source-serif-pro"/>
+              </a:rPr>
+              <a:t>“muitas interfaces específicas são melhores do que uma interface geral” que se </a:t>
+            </a:r>
+            <a:r>
+              <a:rPr lang="pt-BR" b="0" i="0" dirty="0">
+                <a:solidFill>
+                  <a:srgbClr val="292929"/>
+                </a:solidFill>
+                <a:effectLst/>
+                <a:latin typeface="source-serif-pro"/>
+              </a:rPr>
+              <a:t>trata da coesão em interfaces.</a:t>
+            </a:r>
+          </a:p>
+          <a:p>
+            <a:pPr marL="800100" lvl="1" indent="-342900" algn="just">
+              <a:lnSpc>
+                <a:spcPct val="100000"/>
+              </a:lnSpc>
+              <a:buFont typeface="Arial" panose="020B0604020202020204" pitchFamily="34" charset="0"/>
+              <a:buChar char="•"/>
+            </a:pPr>
+            <a:r>
+              <a:rPr lang="pt-BR" b="0" i="0" dirty="0">
+                <a:solidFill>
+                  <a:srgbClr val="292929"/>
+                </a:solidFill>
+                <a:effectLst/>
+                <a:latin typeface="source-serif-pro"/>
+              </a:rPr>
+              <a:t>Da construção de módulos enxutos, ou seja, com poucos comportamentos. Interfaces que possuem muitos comportamentos são difíceis de manter e evoluir, e devem ser evitadas.</a:t>
+            </a:r>
+            <a:endParaRPr lang="pt-BR" sz="1200" b="0" i="0" dirty="0">
+              <a:solidFill>
+                <a:srgbClr val="575756"/>
+              </a:solidFill>
+              <a:effectLst/>
+              <a:latin typeface="Asap" panose="00000500000000000000"/>
+            </a:endParaRPr>
+          </a:p>
+          <a:p>
+            <a:pPr marL="342900" indent="-342900" algn="just">
+              <a:lnSpc>
+                <a:spcPct val="100000"/>
+              </a:lnSpc>
+              <a:buFont typeface="+mj-lt"/>
+              <a:buAutoNum type="arabicPeriod"/>
+            </a:pPr>
+            <a:r>
+              <a:rPr lang="pt-BR" sz="1200" b="1" i="0" dirty="0">
+                <a:solidFill>
+                  <a:srgbClr val="575756"/>
+                </a:solidFill>
+                <a:effectLst/>
+                <a:latin typeface="Asap" panose="00000500000000000000"/>
+              </a:rPr>
               <a:t>D — </a:t>
             </a:r>
             <a:r>
@@ -4229,22 +4245,6 @@
               </a:solidFill>
               <a:effectLst/>
               <a:latin typeface="source-serif-pro"/>
-            </a:endParaRPr>
-          </a:p>
-          <a:p>
-            <a:pPr marL="342900" indent="-342900" algn="just">
-              <a:lnSpc>
-                <a:spcPct val="100000"/>
-              </a:lnSpc>
-              <a:buFont typeface="+mj-lt"/>
-              <a:buAutoNum type="arabicPeriod"/>
-            </a:pPr>
-            <a:endParaRPr lang="pt-BR" sz="1200" b="0" i="0" dirty="0">
-              <a:solidFill>
-                <a:srgbClr val="575756"/>
-              </a:solidFill>
-              <a:effectLst/>
-              <a:latin typeface="Asap" panose="00000500000000000000"/>
             </a:endParaRPr>
           </a:p>
           <a:p>
@@ -9016,7 +9016,7 @@
               </a:lnSpc>
             </a:pPr>
             <a:r>
-              <a:rPr lang="pt-BR" sz="1600" dirty="0">
+              <a:rPr lang="pt-BR" sz="1600" b="1" dirty="0">
                 <a:solidFill>
                   <a:srgbClr val="575756"/>
                 </a:solidFill>
@@ -9025,7 +9025,7 @@
               <a:t>A utilização de uma linguagem comum é chamada em Domain-</a:t>
             </a:r>
             <a:r>
-              <a:rPr lang="pt-BR" sz="1600" dirty="0" err="1">
+              <a:rPr lang="pt-BR" sz="1600" b="1" dirty="0" err="1">
                 <a:solidFill>
                   <a:srgbClr val="575756"/>
                 </a:solidFill>
@@ -9034,7 +9034,7 @@
               <a:t>Driven</a:t>
             </a:r>
             <a:r>
-              <a:rPr lang="pt-BR" sz="1600" dirty="0">
+              <a:rPr lang="pt-BR" sz="1600" b="1" dirty="0">
                 <a:solidFill>
                   <a:srgbClr val="575756"/>
                 </a:solidFill>
@@ -9043,7 +9043,7 @@
               <a:t> Design de </a:t>
             </a:r>
             <a:r>
-              <a:rPr lang="pt-BR" sz="1600" i="1" dirty="0" err="1">
+              <a:rPr lang="pt-BR" sz="1600" b="1" i="1" dirty="0" err="1">
                 <a:solidFill>
                   <a:srgbClr val="575756"/>
                 </a:solidFill>
@@ -9052,7 +9052,7 @@
               <a:t>ubliquitous</a:t>
             </a:r>
             <a:r>
-              <a:rPr lang="pt-BR" sz="1600" i="1" dirty="0">
+              <a:rPr lang="pt-BR" sz="1600" b="1" i="1" dirty="0">
                 <a:solidFill>
                   <a:srgbClr val="575756"/>
                 </a:solidFill>
@@ -9061,7 +9061,7 @@
               <a:t> </a:t>
             </a:r>
             <a:r>
-              <a:rPr lang="pt-BR" sz="1600" i="1" dirty="0" err="1">
+              <a:rPr lang="pt-BR" sz="1600" b="1" i="1" dirty="0" err="1">
                 <a:solidFill>
                   <a:srgbClr val="575756"/>
                 </a:solidFill>
@@ -9070,7 +9070,7 @@
               <a:t>language</a:t>
             </a:r>
             <a:r>
-              <a:rPr lang="pt-BR" sz="1600" i="1" dirty="0">
+              <a:rPr lang="pt-BR" sz="1600" b="1" i="1" dirty="0">
                 <a:solidFill>
                   <a:srgbClr val="575756"/>
                 </a:solidFill>
@@ -9079,7 +9079,7 @@
               <a:t>, </a:t>
             </a:r>
             <a:r>
-              <a:rPr lang="pt-BR" sz="1600" dirty="0">
+              <a:rPr lang="pt-BR" sz="1600" b="1" dirty="0">
                 <a:solidFill>
                   <a:srgbClr val="575756"/>
                 </a:solidFill>
@@ -9087,7 +9087,7 @@
               </a:rPr>
               <a:t>podemos traduzir o termo para linguagem onipresente.</a:t>
             </a:r>
-            <a:endParaRPr lang="pt-BR" sz="1600" i="1" dirty="0">
+            <a:endParaRPr lang="pt-BR" sz="1600" b="1" i="1" dirty="0">
               <a:solidFill>
                 <a:srgbClr val="575756"/>
               </a:solidFill>
@@ -13129,7 +13129,7 @@
               </a:lnSpc>
             </a:pPr>
             <a:r>
-              <a:rPr lang="pt-BR" sz="1600" dirty="0">
+              <a:rPr lang="pt-BR" sz="1600" b="1" dirty="0">
                 <a:solidFill>
                   <a:srgbClr val="575756"/>
                 </a:solidFill>
@@ -14250,7 +14250,61 @@
                 </a:solidFill>
                 <a:latin typeface="Asap" panose="00000500000000000000"/>
               </a:rPr>
-              <a:t>Um dos maiores erros da programação moderna é a escrita de código com “obsolescência programada” ou seja escrevemos código como “escribas”, visando o atendimento do que foi proposto em documento.</a:t>
+              <a:t>Para </a:t>
+            </a:r>
+            <a:r>
+              <a:rPr lang="pt-BR" sz="1600" dirty="0" err="1">
+                <a:solidFill>
+                  <a:srgbClr val="575756"/>
+                </a:solidFill>
+                <a:latin typeface="Asap" panose="00000500000000000000"/>
+              </a:rPr>
+              <a:t>Bjarne</a:t>
+            </a:r>
+            <a:r>
+              <a:rPr lang="pt-BR" sz="1600" dirty="0">
+                <a:solidFill>
+                  <a:srgbClr val="575756"/>
+                </a:solidFill>
+                <a:latin typeface="Asap" panose="00000500000000000000"/>
+              </a:rPr>
+              <a:t> o criador do C++ quando questionado sobre o que é um “Código Limpo”, ele comenta que gosta de seu código </a:t>
+            </a:r>
+            <a:r>
+              <a:rPr lang="pt-BR" sz="1600" b="1" dirty="0">
+                <a:solidFill>
+                  <a:srgbClr val="575756"/>
+                </a:solidFill>
+                <a:latin typeface="Asap" panose="00000500000000000000"/>
+              </a:rPr>
+              <a:t>“elegante” </a:t>
+            </a:r>
+            <a:r>
+              <a:rPr lang="pt-BR" sz="1600" dirty="0">
+                <a:solidFill>
+                  <a:srgbClr val="575756"/>
+                </a:solidFill>
+                <a:latin typeface="Asap" panose="00000500000000000000"/>
+              </a:rPr>
+              <a:t>e  </a:t>
+            </a:r>
+            <a:r>
+              <a:rPr lang="pt-BR" sz="1600" b="1" dirty="0">
+                <a:solidFill>
+                  <a:srgbClr val="575756"/>
+                </a:solidFill>
+                <a:latin typeface="Asap" panose="00000500000000000000"/>
+              </a:rPr>
+              <a:t>“eficiente”, </a:t>
+            </a:r>
+            <a:r>
+              <a:rPr lang="pt-BR" sz="1600" dirty="0">
+                <a:solidFill>
+                  <a:srgbClr val="575756"/>
+                </a:solidFill>
+                <a:latin typeface="Asap" panose="00000500000000000000"/>
+              </a:rPr>
+              <a:t>com uma lógica direta para dificultar o aparecimento de erros e baixo acoplamento para facilitar a manutenção.</a:t>
             </a:r>
           </a:p>
           <a:p>
@@ -14266,7 +14320,43 @@
                 </a:solidFill>
                 <a:latin typeface="Asap" panose="00000500000000000000"/>
               </a:rPr>
-              <a:t>Quando o objetivo é atingido, nós não nos preocupamos, em como esse código irá se comportar no futuro, esse que muitas vezes está mais perto do que pensávamos.</a:t>
+              <a:t>Se pegarmos a citação dele sobre </a:t>
+            </a:r>
+            <a:r>
+              <a:rPr lang="pt-BR" sz="1600" b="1" dirty="0">
+                <a:solidFill>
+                  <a:srgbClr val="575756"/>
+                </a:solidFill>
+                <a:latin typeface="Asap" panose="00000500000000000000"/>
+              </a:rPr>
+              <a:t>“elegante”  </a:t>
+            </a:r>
+            <a:r>
+              <a:rPr lang="pt-BR" sz="1600" dirty="0">
+                <a:solidFill>
+                  <a:srgbClr val="575756"/>
+                </a:solidFill>
+                <a:latin typeface="Asap" panose="00000500000000000000"/>
+              </a:rPr>
+              <a:t>e pesquisarmos no dicionário, podemos observar, definições como “naturalidade e harmonia”, “fino e estiloso” ou seja para </a:t>
+            </a:r>
+            <a:r>
+              <a:rPr lang="pt-BR" sz="1600" dirty="0" err="1">
+                <a:solidFill>
+                  <a:srgbClr val="575756"/>
+                </a:solidFill>
+                <a:latin typeface="Asap" panose="00000500000000000000"/>
+              </a:rPr>
+              <a:t>Bjarne</a:t>
+            </a:r>
+            <a:r>
+              <a:rPr lang="pt-BR" sz="1600" dirty="0">
+                <a:solidFill>
+                  <a:srgbClr val="575756"/>
+                </a:solidFill>
+                <a:latin typeface="Asap" panose="00000500000000000000"/>
+              </a:rPr>
+              <a:t> o código limpo proporciona uma leitura natural; e lê-lo deve ser belo como ouvir uma música por exemplo.</a:t>
             </a:r>
           </a:p>
           <a:p>
@@ -14282,7 +14372,7 @@
                 </a:solidFill>
                 <a:latin typeface="Asap" panose="00000500000000000000"/>
               </a:rPr>
-              <a:t>Aplicações modernas sempre estão evoluindo acompanhando a agressividade do mercado, procurando trazer mais valor.</a:t>
+              <a:t>Já a palavra “eficiente” vindo do criador do C++, talvez faça sentido, porém para nosso dia-a-dia, podemos considerar a eficiência como mecanismos para proporcionar ao código simplicidade e clareza. </a:t>
             </a:r>
           </a:p>
           <a:p>
@@ -14292,45 +14382,13 @@
               </a:lnSpc>
             </a:pPr>
             <a:r>
-              <a:rPr lang="pt-BR" sz="1600" dirty="0">
-                <a:solidFill>
-                  <a:srgbClr val="575756"/>
-                </a:solidFill>
-                <a:latin typeface="Asap" panose="00000500000000000000"/>
-              </a:rPr>
-              <a:t>Com esse crescimento desenfreado, sem as devidas preocupações, geramos aplicações com alto acoplamento (dependência) entre seus componentes.</a:t>
-            </a:r>
-          </a:p>
-          <a:p>
-            <a:pPr algn="just">
-              <a:lnSpc>
-                <a:spcPct val="100000"/>
-              </a:lnSpc>
-            </a:pPr>
-            <a:r>
-              <a:rPr lang="pt-BR" sz="1600" dirty="0">
-                <a:solidFill>
-                  <a:srgbClr val="575756"/>
-                </a:solidFill>
-                <a:latin typeface="Asap" panose="00000500000000000000"/>
-              </a:rPr>
-              <a:t>Quanto maior o acoplamento, maior será a complexidade da manutenção.</a:t>
-            </a:r>
-          </a:p>
-          <a:p>
-            <a:pPr algn="just">
-              <a:lnSpc>
-                <a:spcPct val="100000"/>
-              </a:lnSpc>
-            </a:pPr>
-            <a:r>
               <a:rPr lang="pt-BR" sz="1600" b="1" dirty="0">
                 <a:solidFill>
                   <a:srgbClr val="575756"/>
                 </a:solidFill>
                 <a:latin typeface="Asap" panose="00000500000000000000"/>
               </a:rPr>
-              <a:t>Quando falamos em desenvolvimento, velocidade e capacidade a complexidade é um fator determinante para mensurar o custo total daquela implementação, logo podemos afirmar que complexidade = custo.</a:t>
+              <a:t>Logo Clean Code é um conjunto de práticas para que nosso código seja claro e objetivo no que se propõe a fazer, de maneira que sua leitura seja intuitiva.</a:t>
             </a:r>
           </a:p>
         </p:txBody>
@@ -14351,8 +14409,8 @@
         </p:nvSpPr>
         <p:spPr>
           <a:xfrm>
-            <a:off x="556661" y="1227364"/>
-            <a:ext cx="3423406" cy="1531634"/>
+            <a:off x="712366" y="1227364"/>
+            <a:ext cx="3423406" cy="1535948"/>
           </a:xfrm>
           <a:prstGeom prst="rect">
             <a:avLst/>
@@ -14408,10 +14466,221 @@
       </p:sp>
       <p:sp>
         <p:nvSpPr>
-          <p:cNvPr id="2" name="Retângulo 1">
+          <p:cNvPr id="5" name="Espaço Reservado para Conteúdo 2">
             <a:extLst>
               <a:ext uri="{FF2B5EF4-FFF2-40B4-BE49-F238E27FC236}">
-                <a16:creationId xmlns:a16="http://schemas.microsoft.com/office/drawing/2014/main" id="{8E36D803-4DDA-60A9-32E4-0DA06591FC95}"/>
+                <a16:creationId xmlns:a16="http://schemas.microsoft.com/office/drawing/2014/main" id="{298CF56C-531D-456B-926E-E1934EBBFA79}"/>
+              </a:ext>
+            </a:extLst>
+          </p:cNvPr>
+          <p:cNvSpPr txBox="1">
+            <a:spLocks/>
+          </p:cNvSpPr>
+          <p:nvPr/>
+        </p:nvSpPr>
+        <p:spPr>
+          <a:xfrm>
+            <a:off x="3885176" y="1430000"/>
+            <a:ext cx="7350904" cy="4403272"/>
+          </a:xfrm>
+          <a:prstGeom prst="rect">
+            <a:avLst/>
+          </a:prstGeom>
+        </p:spPr>
+        <p:txBody>
+          <a:bodyPr vert="horz" lIns="91440" tIns="45720" rIns="91440" bIns="45720" rtlCol="0">
+            <a:normAutofit/>
+          </a:bodyPr>
+          <a:lstStyle>
+            <a:lvl1pPr marL="228600" indent="-228600" algn="l" defTabSz="914400" rtl="0" eaLnBrk="1" latinLnBrk="0" hangingPunct="1">
+              <a:lnSpc>
+                <a:spcPct val="90000"/>
+              </a:lnSpc>
+              <a:spcBef>
+                <a:spcPts val="1000"/>
+              </a:spcBef>
+              <a:buFont typeface="Arial" panose="020B0604020202020204" pitchFamily="34" charset="0"/>
+              <a:buChar char="•"/>
+              <a:defRPr sz="2800" kern="1200">
+                <a:solidFill>
+                  <a:schemeClr val="tx1"/>
+                </a:solidFill>
+                <a:latin typeface="+mn-lt"/>
+                <a:ea typeface="+mn-ea"/>
+                <a:cs typeface="+mn-cs"/>
+              </a:defRPr>
+            </a:lvl1pPr>
+            <a:lvl2pPr marL="685800" indent="-228600" algn="l" defTabSz="914400" rtl="0" eaLnBrk="1" latinLnBrk="0" hangingPunct="1">
+              <a:lnSpc>
+                <a:spcPct val="90000"/>
+              </a:lnSpc>
+              <a:spcBef>
+                <a:spcPts val="500"/>
+              </a:spcBef>
+              <a:buFont typeface="Arial" panose="020B0604020202020204" pitchFamily="34" charset="0"/>
+              <a:buChar char="•"/>
+              <a:defRPr sz="2400" kern="1200">
+                <a:solidFill>
+                  <a:schemeClr val="tx1"/>
+                </a:solidFill>
+                <a:latin typeface="+mn-lt"/>
+                <a:ea typeface="+mn-ea"/>
+                <a:cs typeface="+mn-cs"/>
+              </a:defRPr>
+            </a:lvl2pPr>
+            <a:lvl3pPr marL="1143000" indent="-228600" algn="l" defTabSz="914400" rtl="0" eaLnBrk="1" latinLnBrk="0" hangingPunct="1">
+              <a:lnSpc>
+                <a:spcPct val="90000"/>
+              </a:lnSpc>
+              <a:spcBef>
+                <a:spcPts val="500"/>
+              </a:spcBef>
+              <a:buFont typeface="Arial" panose="020B0604020202020204" pitchFamily="34" charset="0"/>
+              <a:buChar char="•"/>
+              <a:defRPr sz="2000" kern="1200">
+                <a:solidFill>
+                  <a:schemeClr val="tx1"/>
+                </a:solidFill>
+                <a:latin typeface="+mn-lt"/>
+                <a:ea typeface="+mn-ea"/>
+                <a:cs typeface="+mn-cs"/>
+              </a:defRPr>
+            </a:lvl3pPr>
+            <a:lvl4pPr marL="1600200" indent="-228600" algn="l" defTabSz="914400" rtl="0" eaLnBrk="1" latinLnBrk="0" hangingPunct="1">
+              <a:lnSpc>
+                <a:spcPct val="90000"/>
+              </a:lnSpc>
+              <a:spcBef>
+                <a:spcPts val="500"/>
+              </a:spcBef>
+              <a:buFont typeface="Arial" panose="020B0604020202020204" pitchFamily="34" charset="0"/>
+              <a:buChar char="•"/>
+              <a:defRPr sz="1800" kern="1200">
+                <a:solidFill>
+                  <a:schemeClr val="tx1"/>
+                </a:solidFill>
+                <a:latin typeface="+mn-lt"/>
+                <a:ea typeface="+mn-ea"/>
+                <a:cs typeface="+mn-cs"/>
+              </a:defRPr>
+            </a:lvl4pPr>
+            <a:lvl5pPr marL="2057400" indent="-228600" algn="l" defTabSz="914400" rtl="0" eaLnBrk="1" latinLnBrk="0" hangingPunct="1">
+              <a:lnSpc>
+                <a:spcPct val="90000"/>
+              </a:lnSpc>
+              <a:spcBef>
+                <a:spcPts val="500"/>
+              </a:spcBef>
+              <a:buFont typeface="Arial" panose="020B0604020202020204" pitchFamily="34" charset="0"/>
+              <a:buChar char="•"/>
+              <a:defRPr sz="1800" kern="1200">
+                <a:solidFill>
+                  <a:schemeClr val="tx1"/>
+                </a:solidFill>
+                <a:latin typeface="+mn-lt"/>
+                <a:ea typeface="+mn-ea"/>
+                <a:cs typeface="+mn-cs"/>
+              </a:defRPr>
+            </a:lvl5pPr>
+            <a:lvl6pPr marL="2514600" indent="-228600" algn="l" defTabSz="914400" rtl="0" eaLnBrk="1" latinLnBrk="0" hangingPunct="1">
+              <a:lnSpc>
+                <a:spcPct val="90000"/>
+              </a:lnSpc>
+              <a:spcBef>
+                <a:spcPts val="500"/>
+              </a:spcBef>
+              <a:buFont typeface="Arial" panose="020B0604020202020204" pitchFamily="34" charset="0"/>
+              <a:buChar char="•"/>
+              <a:defRPr sz="1800" kern="1200">
+                <a:solidFill>
+                  <a:schemeClr val="tx1"/>
+                </a:solidFill>
+                <a:latin typeface="+mn-lt"/>
+                <a:ea typeface="+mn-ea"/>
+                <a:cs typeface="+mn-cs"/>
+              </a:defRPr>
+            </a:lvl6pPr>
+            <a:lvl7pPr marL="2971800" indent="-228600" algn="l" defTabSz="914400" rtl="0" eaLnBrk="1" latinLnBrk="0" hangingPunct="1">
+              <a:lnSpc>
+                <a:spcPct val="90000"/>
+              </a:lnSpc>
+              <a:spcBef>
+                <a:spcPts val="500"/>
+              </a:spcBef>
+              <a:buFont typeface="Arial" panose="020B0604020202020204" pitchFamily="34" charset="0"/>
+              <a:buChar char="•"/>
+              <a:defRPr sz="1800" kern="1200">
+                <a:solidFill>
+                  <a:schemeClr val="tx1"/>
+                </a:solidFill>
+                <a:latin typeface="+mn-lt"/>
+                <a:ea typeface="+mn-ea"/>
+                <a:cs typeface="+mn-cs"/>
+              </a:defRPr>
+            </a:lvl7pPr>
+            <a:lvl8pPr marL="3429000" indent="-228600" algn="l" defTabSz="914400" rtl="0" eaLnBrk="1" latinLnBrk="0" hangingPunct="1">
+              <a:lnSpc>
+                <a:spcPct val="90000"/>
+              </a:lnSpc>
+              <a:spcBef>
+                <a:spcPts val="500"/>
+              </a:spcBef>
+              <a:buFont typeface="Arial" panose="020B0604020202020204" pitchFamily="34" charset="0"/>
+              <a:buChar char="•"/>
+              <a:defRPr sz="1800" kern="1200">
+                <a:solidFill>
+                  <a:schemeClr val="tx1"/>
+                </a:solidFill>
+                <a:latin typeface="+mn-lt"/>
+                <a:ea typeface="+mn-ea"/>
+                <a:cs typeface="+mn-cs"/>
+              </a:defRPr>
+            </a:lvl8pPr>
+            <a:lvl9pPr marL="3886200" indent="-228600" algn="l" defTabSz="914400" rtl="0" eaLnBrk="1" latinLnBrk="0" hangingPunct="1">
+              <a:lnSpc>
+                <a:spcPct val="90000"/>
+              </a:lnSpc>
+              <a:spcBef>
+                <a:spcPts val="500"/>
+              </a:spcBef>
+              <a:buFont typeface="Arial" panose="020B0604020202020204" pitchFamily="34" charset="0"/>
+              <a:buChar char="•"/>
+              <a:defRPr sz="1800" kern="1200">
+                <a:solidFill>
+                  <a:schemeClr val="tx1"/>
+                </a:solidFill>
+                <a:latin typeface="+mn-lt"/>
+                <a:ea typeface="+mn-ea"/>
+                <a:cs typeface="+mn-cs"/>
+              </a:defRPr>
+            </a:lvl9pPr>
+          </a:lstStyle>
+          <a:p>
+            <a:pPr marL="0" indent="0">
+              <a:lnSpc>
+                <a:spcPct val="100000"/>
+              </a:lnSpc>
+              <a:buFont typeface="Arial" panose="020B0604020202020204" pitchFamily="34" charset="0"/>
+              <a:buNone/>
+            </a:pPr>
+            <a:r>
+              <a:rPr lang="pt-BR" sz="2600" dirty="0">
+                <a:solidFill>
+                  <a:srgbClr val="575756"/>
+                </a:solidFill>
+                <a:latin typeface="Asap" panose="00000500000000000000" pitchFamily="2" charset="0"/>
+              </a:rPr>
+              <a:t> </a:t>
+            </a:r>
+          </a:p>
+        </p:txBody>
+      </p:sp>
+      <p:sp>
+        <p:nvSpPr>
+          <p:cNvPr id="4" name="Retângulo 3">
+            <a:extLst>
+              <a:ext uri="{FF2B5EF4-FFF2-40B4-BE49-F238E27FC236}">
+                <a16:creationId xmlns:a16="http://schemas.microsoft.com/office/drawing/2014/main" id="{0A9AE514-C283-A8B9-0EA0-7498936E0F5B}"/>
               </a:ext>
             </a:extLst>
           </p:cNvPr>
@@ -14420,8 +14689,8 @@
         </p:nvSpPr>
         <p:spPr>
           <a:xfrm>
-            <a:off x="4135772" y="4511615"/>
-            <a:ext cx="6715489" cy="948906"/>
+            <a:off x="4135772" y="4270075"/>
+            <a:ext cx="6871534" cy="897508"/>
           </a:xfrm>
           <a:prstGeom prst="rect">
             <a:avLst/>
@@ -14463,7 +14732,7 @@
     </p:spTree>
     <p:extLst>
       <p:ext uri="{BB962C8B-B14F-4D97-AF65-F5344CB8AC3E}">
-        <p14:creationId xmlns:p14="http://schemas.microsoft.com/office/powerpoint/2010/main" val="3863630888"/>
+        <p14:creationId xmlns:p14="http://schemas.microsoft.com/office/powerpoint/2010/main" val="851026022"/>
       </p:ext>
     </p:extLst>
   </p:cSld>
@@ -14530,555 +14799,6 @@
                 </a:solidFill>
                 <a:latin typeface="Asap" panose="00000500000000000000"/>
               </a:rPr>
-              <a:t>Para </a:t>
-            </a:r>
-            <a:r>
-              <a:rPr lang="pt-BR" sz="1600" dirty="0" err="1">
-                <a:solidFill>
-                  <a:srgbClr val="575756"/>
-                </a:solidFill>
-                <a:latin typeface="Asap" panose="00000500000000000000"/>
-              </a:rPr>
-              <a:t>Bjarne</a:t>
-            </a:r>
-            <a:r>
-              <a:rPr lang="pt-BR" sz="1600" dirty="0">
-                <a:solidFill>
-                  <a:srgbClr val="575756"/>
-                </a:solidFill>
-                <a:latin typeface="Asap" panose="00000500000000000000"/>
-              </a:rPr>
-              <a:t> o criador do C++ quando questionado sobre o que é um “Código Limpo”, ele comenta que gosta de seu código </a:t>
-            </a:r>
-            <a:r>
-              <a:rPr lang="pt-BR" sz="1600" b="1" dirty="0">
-                <a:solidFill>
-                  <a:srgbClr val="575756"/>
-                </a:solidFill>
-                <a:latin typeface="Asap" panose="00000500000000000000"/>
-              </a:rPr>
-              <a:t>“elegante” </a:t>
-            </a:r>
-            <a:r>
-              <a:rPr lang="pt-BR" sz="1600" dirty="0">
-                <a:solidFill>
-                  <a:srgbClr val="575756"/>
-                </a:solidFill>
-                <a:latin typeface="Asap" panose="00000500000000000000"/>
-              </a:rPr>
-              <a:t>e  </a:t>
-            </a:r>
-            <a:r>
-              <a:rPr lang="pt-BR" sz="1600" b="1" dirty="0">
-                <a:solidFill>
-                  <a:srgbClr val="575756"/>
-                </a:solidFill>
-                <a:latin typeface="Asap" panose="00000500000000000000"/>
-              </a:rPr>
-              <a:t>“eficiente”, </a:t>
-            </a:r>
-            <a:r>
-              <a:rPr lang="pt-BR" sz="1600" dirty="0">
-                <a:solidFill>
-                  <a:srgbClr val="575756"/>
-                </a:solidFill>
-                <a:latin typeface="Asap" panose="00000500000000000000"/>
-              </a:rPr>
-              <a:t>com uma lógica direta para dificultar o aparecimento de erros e baixo acoplamento para facilitar a manutenção.</a:t>
-            </a:r>
-          </a:p>
-          <a:p>
-            <a:pPr algn="just">
-              <a:lnSpc>
-                <a:spcPct val="100000"/>
-              </a:lnSpc>
-            </a:pPr>
-            <a:r>
-              <a:rPr lang="pt-BR" sz="1600" dirty="0">
-                <a:solidFill>
-                  <a:srgbClr val="575756"/>
-                </a:solidFill>
-                <a:latin typeface="Asap" panose="00000500000000000000"/>
-              </a:rPr>
-              <a:t>Se pegarmos a citação dele sobre </a:t>
-            </a:r>
-            <a:r>
-              <a:rPr lang="pt-BR" sz="1600" b="1" dirty="0">
-                <a:solidFill>
-                  <a:srgbClr val="575756"/>
-                </a:solidFill>
-                <a:latin typeface="Asap" panose="00000500000000000000"/>
-              </a:rPr>
-              <a:t>“elegante”  </a:t>
-            </a:r>
-            <a:r>
-              <a:rPr lang="pt-BR" sz="1600" dirty="0">
-                <a:solidFill>
-                  <a:srgbClr val="575756"/>
-                </a:solidFill>
-                <a:latin typeface="Asap" panose="00000500000000000000"/>
-              </a:rPr>
-              <a:t>e pesquisarmos no dicionário, podemos observar, definições como “naturalidade e harmonia”, “fino e estiloso” ou seja para </a:t>
-            </a:r>
-            <a:r>
-              <a:rPr lang="pt-BR" sz="1600" dirty="0" err="1">
-                <a:solidFill>
-                  <a:srgbClr val="575756"/>
-                </a:solidFill>
-                <a:latin typeface="Asap" panose="00000500000000000000"/>
-              </a:rPr>
-              <a:t>Bjarne</a:t>
-            </a:r>
-            <a:r>
-              <a:rPr lang="pt-BR" sz="1600" dirty="0">
-                <a:solidFill>
-                  <a:srgbClr val="575756"/>
-                </a:solidFill>
-                <a:latin typeface="Asap" panose="00000500000000000000"/>
-              </a:rPr>
-              <a:t> o código limpo proporciona uma leitura natural; e lê-lo deve ser belo como ouvir uma música por exemplo.</a:t>
-            </a:r>
-          </a:p>
-          <a:p>
-            <a:pPr algn="just">
-              <a:lnSpc>
-                <a:spcPct val="100000"/>
-              </a:lnSpc>
-            </a:pPr>
-            <a:r>
-              <a:rPr lang="pt-BR" sz="1600" dirty="0">
-                <a:solidFill>
-                  <a:srgbClr val="575756"/>
-                </a:solidFill>
-                <a:latin typeface="Asap" panose="00000500000000000000"/>
-              </a:rPr>
-              <a:t>Já a palavra “eficiente” vindo do criador do C++, talvez faça sentido, porém para nosso dia-a-dia, podemos considerar a eficiência como mecanismos para proporcionar ao código simplicidade e clareza. </a:t>
-            </a:r>
-          </a:p>
-          <a:p>
-            <a:pPr algn="just">
-              <a:lnSpc>
-                <a:spcPct val="100000"/>
-              </a:lnSpc>
-            </a:pPr>
-            <a:r>
-              <a:rPr lang="pt-BR" sz="1600" b="1" dirty="0">
-                <a:solidFill>
-                  <a:srgbClr val="575756"/>
-                </a:solidFill>
-                <a:latin typeface="Asap" panose="00000500000000000000"/>
-              </a:rPr>
-              <a:t>Logo Clean Code é um conjunto de práticas para que nosso código seja claro e objetivo no que se propõe a fazer, de maneira que sua leitura seja intuitiva.</a:t>
-            </a:r>
-          </a:p>
-        </p:txBody>
-      </p:sp>
-      <p:sp>
-        <p:nvSpPr>
-          <p:cNvPr id="6" name="Título 1">
-            <a:extLst>
-              <a:ext uri="{FF2B5EF4-FFF2-40B4-BE49-F238E27FC236}">
-                <a16:creationId xmlns:a16="http://schemas.microsoft.com/office/drawing/2014/main" id="{29506E41-E78A-4624-9442-2C05FCDFFDD1}"/>
-              </a:ext>
-            </a:extLst>
-          </p:cNvPr>
-          <p:cNvSpPr txBox="1">
-            <a:spLocks/>
-          </p:cNvSpPr>
-          <p:nvPr/>
-        </p:nvSpPr>
-        <p:spPr>
-          <a:xfrm>
-            <a:off x="712366" y="1227364"/>
-            <a:ext cx="3423406" cy="1535948"/>
-          </a:xfrm>
-          <a:prstGeom prst="rect">
-            <a:avLst/>
-          </a:prstGeom>
-        </p:spPr>
-        <p:txBody>
-          <a:bodyPr vert="horz" lIns="91440" tIns="45720" rIns="91440" bIns="45720" rtlCol="0" anchor="ctr">
-            <a:normAutofit fontScale="97500"/>
-          </a:bodyPr>
-          <a:lstStyle>
-            <a:lvl1pPr algn="l" defTabSz="914400" rtl="0" eaLnBrk="1" latinLnBrk="0" hangingPunct="1">
-              <a:lnSpc>
-                <a:spcPct val="90000"/>
-              </a:lnSpc>
-              <a:spcBef>
-                <a:spcPct val="0"/>
-              </a:spcBef>
-              <a:buNone/>
-              <a:defRPr sz="4400" kern="1200">
-                <a:solidFill>
-                  <a:schemeClr val="tx1"/>
-                </a:solidFill>
-                <a:latin typeface="+mj-lt"/>
-                <a:ea typeface="+mj-ea"/>
-                <a:cs typeface="+mj-cs"/>
-              </a:defRPr>
-            </a:lvl1pPr>
-          </a:lstStyle>
-          <a:p>
-            <a:r>
-              <a:rPr lang="pt-BR" b="1" dirty="0">
-                <a:solidFill>
-                  <a:srgbClr val="22438A"/>
-                </a:solidFill>
-                <a:latin typeface="Asap" panose="00000500000000000000" pitchFamily="2" charset="0"/>
-              </a:rPr>
-              <a:t>O que é </a:t>
-            </a:r>
-          </a:p>
-          <a:p>
-            <a:r>
-              <a:rPr lang="pt-BR" b="1" dirty="0">
-                <a:solidFill>
-                  <a:srgbClr val="22438A"/>
-                </a:solidFill>
-                <a:latin typeface="Asap" panose="00000500000000000000" pitchFamily="2" charset="0"/>
-              </a:rPr>
-              <a:t>Clean Code ?</a:t>
-            </a:r>
-            <a:endParaRPr lang="pt-BR" b="1" dirty="0"/>
-          </a:p>
-        </p:txBody>
-      </p:sp>
-      <p:sp>
-        <p:nvSpPr>
-          <p:cNvPr id="5" name="Espaço Reservado para Conteúdo 2">
-            <a:extLst>
-              <a:ext uri="{FF2B5EF4-FFF2-40B4-BE49-F238E27FC236}">
-                <a16:creationId xmlns:a16="http://schemas.microsoft.com/office/drawing/2014/main" id="{298CF56C-531D-456B-926E-E1934EBBFA79}"/>
-              </a:ext>
-            </a:extLst>
-          </p:cNvPr>
-          <p:cNvSpPr txBox="1">
-            <a:spLocks/>
-          </p:cNvSpPr>
-          <p:nvPr/>
-        </p:nvSpPr>
-        <p:spPr>
-          <a:xfrm>
-            <a:off x="3885176" y="1430000"/>
-            <a:ext cx="7350904" cy="4403272"/>
-          </a:xfrm>
-          <a:prstGeom prst="rect">
-            <a:avLst/>
-          </a:prstGeom>
-        </p:spPr>
-        <p:txBody>
-          <a:bodyPr vert="horz" lIns="91440" tIns="45720" rIns="91440" bIns="45720" rtlCol="0">
-            <a:normAutofit/>
-          </a:bodyPr>
-          <a:lstStyle>
-            <a:lvl1pPr marL="228600" indent="-228600" algn="l" defTabSz="914400" rtl="0" eaLnBrk="1" latinLnBrk="0" hangingPunct="1">
-              <a:lnSpc>
-                <a:spcPct val="90000"/>
-              </a:lnSpc>
-              <a:spcBef>
-                <a:spcPts val="1000"/>
-              </a:spcBef>
-              <a:buFont typeface="Arial" panose="020B0604020202020204" pitchFamily="34" charset="0"/>
-              <a:buChar char="•"/>
-              <a:defRPr sz="2800" kern="1200">
-                <a:solidFill>
-                  <a:schemeClr val="tx1"/>
-                </a:solidFill>
-                <a:latin typeface="+mn-lt"/>
-                <a:ea typeface="+mn-ea"/>
-                <a:cs typeface="+mn-cs"/>
-              </a:defRPr>
-            </a:lvl1pPr>
-            <a:lvl2pPr marL="685800" indent="-228600" algn="l" defTabSz="914400" rtl="0" eaLnBrk="1" latinLnBrk="0" hangingPunct="1">
-              <a:lnSpc>
-                <a:spcPct val="90000"/>
-              </a:lnSpc>
-              <a:spcBef>
-                <a:spcPts val="500"/>
-              </a:spcBef>
-              <a:buFont typeface="Arial" panose="020B0604020202020204" pitchFamily="34" charset="0"/>
-              <a:buChar char="•"/>
-              <a:defRPr sz="2400" kern="1200">
-                <a:solidFill>
-                  <a:schemeClr val="tx1"/>
-                </a:solidFill>
-                <a:latin typeface="+mn-lt"/>
-                <a:ea typeface="+mn-ea"/>
-                <a:cs typeface="+mn-cs"/>
-              </a:defRPr>
-            </a:lvl2pPr>
-            <a:lvl3pPr marL="1143000" indent="-228600" algn="l" defTabSz="914400" rtl="0" eaLnBrk="1" latinLnBrk="0" hangingPunct="1">
-              <a:lnSpc>
-                <a:spcPct val="90000"/>
-              </a:lnSpc>
-              <a:spcBef>
-                <a:spcPts val="500"/>
-              </a:spcBef>
-              <a:buFont typeface="Arial" panose="020B0604020202020204" pitchFamily="34" charset="0"/>
-              <a:buChar char="•"/>
-              <a:defRPr sz="2000" kern="1200">
-                <a:solidFill>
-                  <a:schemeClr val="tx1"/>
-                </a:solidFill>
-                <a:latin typeface="+mn-lt"/>
-                <a:ea typeface="+mn-ea"/>
-                <a:cs typeface="+mn-cs"/>
-              </a:defRPr>
-            </a:lvl3pPr>
-            <a:lvl4pPr marL="1600200" indent="-228600" algn="l" defTabSz="914400" rtl="0" eaLnBrk="1" latinLnBrk="0" hangingPunct="1">
-              <a:lnSpc>
-                <a:spcPct val="90000"/>
-              </a:lnSpc>
-              <a:spcBef>
-                <a:spcPts val="500"/>
-              </a:spcBef>
-              <a:buFont typeface="Arial" panose="020B0604020202020204" pitchFamily="34" charset="0"/>
-              <a:buChar char="•"/>
-              <a:defRPr sz="1800" kern="1200">
-                <a:solidFill>
-                  <a:schemeClr val="tx1"/>
-                </a:solidFill>
-                <a:latin typeface="+mn-lt"/>
-                <a:ea typeface="+mn-ea"/>
-                <a:cs typeface="+mn-cs"/>
-              </a:defRPr>
-            </a:lvl4pPr>
-            <a:lvl5pPr marL="2057400" indent="-228600" algn="l" defTabSz="914400" rtl="0" eaLnBrk="1" latinLnBrk="0" hangingPunct="1">
-              <a:lnSpc>
-                <a:spcPct val="90000"/>
-              </a:lnSpc>
-              <a:spcBef>
-                <a:spcPts val="500"/>
-              </a:spcBef>
-              <a:buFont typeface="Arial" panose="020B0604020202020204" pitchFamily="34" charset="0"/>
-              <a:buChar char="•"/>
-              <a:defRPr sz="1800" kern="1200">
-                <a:solidFill>
-                  <a:schemeClr val="tx1"/>
-                </a:solidFill>
-                <a:latin typeface="+mn-lt"/>
-                <a:ea typeface="+mn-ea"/>
-                <a:cs typeface="+mn-cs"/>
-              </a:defRPr>
-            </a:lvl5pPr>
-            <a:lvl6pPr marL="2514600" indent="-228600" algn="l" defTabSz="914400" rtl="0" eaLnBrk="1" latinLnBrk="0" hangingPunct="1">
-              <a:lnSpc>
-                <a:spcPct val="90000"/>
-              </a:lnSpc>
-              <a:spcBef>
-                <a:spcPts val="500"/>
-              </a:spcBef>
-              <a:buFont typeface="Arial" panose="020B0604020202020204" pitchFamily="34" charset="0"/>
-              <a:buChar char="•"/>
-              <a:defRPr sz="1800" kern="1200">
-                <a:solidFill>
-                  <a:schemeClr val="tx1"/>
-                </a:solidFill>
-                <a:latin typeface="+mn-lt"/>
-                <a:ea typeface="+mn-ea"/>
-                <a:cs typeface="+mn-cs"/>
-              </a:defRPr>
-            </a:lvl6pPr>
-            <a:lvl7pPr marL="2971800" indent="-228600" algn="l" defTabSz="914400" rtl="0" eaLnBrk="1" latinLnBrk="0" hangingPunct="1">
-              <a:lnSpc>
-                <a:spcPct val="90000"/>
-              </a:lnSpc>
-              <a:spcBef>
-                <a:spcPts val="500"/>
-              </a:spcBef>
-              <a:buFont typeface="Arial" panose="020B0604020202020204" pitchFamily="34" charset="0"/>
-              <a:buChar char="•"/>
-              <a:defRPr sz="1800" kern="1200">
-                <a:solidFill>
-                  <a:schemeClr val="tx1"/>
-                </a:solidFill>
-                <a:latin typeface="+mn-lt"/>
-                <a:ea typeface="+mn-ea"/>
-                <a:cs typeface="+mn-cs"/>
-              </a:defRPr>
-            </a:lvl7pPr>
-            <a:lvl8pPr marL="3429000" indent="-228600" algn="l" defTabSz="914400" rtl="0" eaLnBrk="1" latinLnBrk="0" hangingPunct="1">
-              <a:lnSpc>
-                <a:spcPct val="90000"/>
-              </a:lnSpc>
-              <a:spcBef>
-                <a:spcPts val="500"/>
-              </a:spcBef>
-              <a:buFont typeface="Arial" panose="020B0604020202020204" pitchFamily="34" charset="0"/>
-              <a:buChar char="•"/>
-              <a:defRPr sz="1800" kern="1200">
-                <a:solidFill>
-                  <a:schemeClr val="tx1"/>
-                </a:solidFill>
-                <a:latin typeface="+mn-lt"/>
-                <a:ea typeface="+mn-ea"/>
-                <a:cs typeface="+mn-cs"/>
-              </a:defRPr>
-            </a:lvl8pPr>
-            <a:lvl9pPr marL="3886200" indent="-228600" algn="l" defTabSz="914400" rtl="0" eaLnBrk="1" latinLnBrk="0" hangingPunct="1">
-              <a:lnSpc>
-                <a:spcPct val="90000"/>
-              </a:lnSpc>
-              <a:spcBef>
-                <a:spcPts val="500"/>
-              </a:spcBef>
-              <a:buFont typeface="Arial" panose="020B0604020202020204" pitchFamily="34" charset="0"/>
-              <a:buChar char="•"/>
-              <a:defRPr sz="1800" kern="1200">
-                <a:solidFill>
-                  <a:schemeClr val="tx1"/>
-                </a:solidFill>
-                <a:latin typeface="+mn-lt"/>
-                <a:ea typeface="+mn-ea"/>
-                <a:cs typeface="+mn-cs"/>
-              </a:defRPr>
-            </a:lvl9pPr>
-          </a:lstStyle>
-          <a:p>
-            <a:pPr marL="0" indent="0">
-              <a:lnSpc>
-                <a:spcPct val="100000"/>
-              </a:lnSpc>
-              <a:buFont typeface="Arial" panose="020B0604020202020204" pitchFamily="34" charset="0"/>
-              <a:buNone/>
-            </a:pPr>
-            <a:r>
-              <a:rPr lang="pt-BR" sz="2600" dirty="0">
-                <a:solidFill>
-                  <a:srgbClr val="575756"/>
-                </a:solidFill>
-                <a:latin typeface="Asap" panose="00000500000000000000" pitchFamily="2" charset="0"/>
-              </a:rPr>
-              <a:t> </a:t>
-            </a:r>
-          </a:p>
-        </p:txBody>
-      </p:sp>
-      <p:sp>
-        <p:nvSpPr>
-          <p:cNvPr id="4" name="Retângulo 3">
-            <a:extLst>
-              <a:ext uri="{FF2B5EF4-FFF2-40B4-BE49-F238E27FC236}">
-                <a16:creationId xmlns:a16="http://schemas.microsoft.com/office/drawing/2014/main" id="{0A9AE514-C283-A8B9-0EA0-7498936E0F5B}"/>
-              </a:ext>
-            </a:extLst>
-          </p:cNvPr>
-          <p:cNvSpPr/>
-          <p:nvPr/>
-        </p:nvSpPr>
-        <p:spPr>
-          <a:xfrm>
-            <a:off x="4135772" y="4270075"/>
-            <a:ext cx="6871534" cy="897508"/>
-          </a:xfrm>
-          <a:prstGeom prst="rect">
-            <a:avLst/>
-          </a:prstGeom>
-          <a:noFill/>
-          <a:ln w="9525" cap="flat" cmpd="sng" algn="ctr">
-            <a:solidFill>
-              <a:schemeClr val="accent1"/>
-            </a:solidFill>
-            <a:prstDash val="solid"/>
-            <a:round/>
-            <a:headEnd type="none" w="med" len="med"/>
-            <a:tailEnd type="none" w="med" len="med"/>
-          </a:ln>
-        </p:spPr>
-        <p:style>
-          <a:lnRef idx="0">
-            <a:scrgbClr r="0" g="0" b="0"/>
-          </a:lnRef>
-          <a:fillRef idx="0">
-            <a:scrgbClr r="0" g="0" b="0"/>
-          </a:fillRef>
-          <a:effectRef idx="0">
-            <a:scrgbClr r="0" g="0" b="0"/>
-          </a:effectRef>
-          <a:fontRef idx="minor">
-            <a:schemeClr val="accent1"/>
-          </a:fontRef>
-        </p:style>
-        <p:txBody>
-          <a:bodyPr rtlCol="0" anchor="ctr"/>
-          <a:lstStyle/>
-          <a:p>
-            <a:pPr algn="ctr"/>
-            <a:endParaRPr lang="pt-BR"/>
-          </a:p>
-        </p:txBody>
-      </p:sp>
-    </p:spTree>
-    <p:extLst>
-      <p:ext uri="{BB962C8B-B14F-4D97-AF65-F5344CB8AC3E}">
-        <p14:creationId xmlns:p14="http://schemas.microsoft.com/office/powerpoint/2010/main" val="851026022"/>
-      </p:ext>
-    </p:extLst>
-  </p:cSld>
-  <p:clrMapOvr>
-    <a:masterClrMapping/>
-  </p:clrMapOvr>
-</p:sld>
-</file>
-
-<file path=ppt/slides/slide6.xml><?xml version="1.0" encoding="utf-8"?>
-<p:sld xmlns:a="http://schemas.openxmlformats.org/drawingml/2006/main" xmlns:r="http://schemas.openxmlformats.org/officeDocument/2006/relationships" xmlns:p="http://schemas.openxmlformats.org/presentationml/2006/main">
-  <p:cSld>
-    <p:spTree>
-      <p:nvGrpSpPr>
-        <p:cNvPr id="1" name=""/>
-        <p:cNvGrpSpPr/>
-        <p:nvPr/>
-      </p:nvGrpSpPr>
-      <p:grpSpPr>
-        <a:xfrm>
-          <a:off x="0" y="0"/>
-          <a:ext cx="0" cy="0"/>
-          <a:chOff x="0" y="0"/>
-          <a:chExt cx="0" cy="0"/>
-        </a:xfrm>
-      </p:grpSpPr>
-      <p:sp>
-        <p:nvSpPr>
-          <p:cNvPr id="3" name="Espaço Reservado para Conteúdo 2">
-            <a:extLst>
-              <a:ext uri="{FF2B5EF4-FFF2-40B4-BE49-F238E27FC236}">
-                <a16:creationId xmlns:a16="http://schemas.microsoft.com/office/drawing/2014/main" id="{40381986-94CF-4578-8578-5FEC2FA85378}"/>
-              </a:ext>
-            </a:extLst>
-          </p:cNvPr>
-          <p:cNvSpPr>
-            <a:spLocks noGrp="1"/>
-          </p:cNvSpPr>
-          <p:nvPr>
-            <p:ph idx="1"/>
-          </p:nvPr>
-        </p:nvSpPr>
-        <p:spPr>
-          <a:xfrm>
-            <a:off x="4135772" y="1227364"/>
-            <a:ext cx="6715489" cy="4403272"/>
-          </a:xfrm>
-        </p:spPr>
-        <p:txBody>
-          <a:bodyPr>
-            <a:normAutofit/>
-          </a:bodyPr>
-          <a:lstStyle/>
-          <a:p>
-            <a:pPr algn="just">
-              <a:lnSpc>
-                <a:spcPct val="100000"/>
-              </a:lnSpc>
-            </a:pPr>
-            <a:r>
-              <a:rPr lang="pt-BR" sz="1600" dirty="0">
-                <a:solidFill>
-                  <a:srgbClr val="575756"/>
-                </a:solidFill>
-                <a:latin typeface="Asap" panose="00000500000000000000"/>
-              </a:rPr>
               <a:t>No livro do </a:t>
             </a:r>
             <a:r>
@@ -15622,6 +15342,373 @@
     <p:extLst>
       <p:ext uri="{BB962C8B-B14F-4D97-AF65-F5344CB8AC3E}">
         <p14:creationId xmlns:p14="http://schemas.microsoft.com/office/powerpoint/2010/main" val="3533973137"/>
+      </p:ext>
+    </p:extLst>
+  </p:cSld>
+  <p:clrMapOvr>
+    <a:masterClrMapping/>
+  </p:clrMapOvr>
+</p:sld>
+</file>
+
+<file path=ppt/slides/slide6.xml><?xml version="1.0" encoding="utf-8"?>
+<p:sld xmlns:a="http://schemas.openxmlformats.org/drawingml/2006/main" xmlns:r="http://schemas.openxmlformats.org/officeDocument/2006/relationships" xmlns:p="http://schemas.openxmlformats.org/presentationml/2006/main">
+  <p:cSld>
+    <p:spTree>
+      <p:nvGrpSpPr>
+        <p:cNvPr id="1" name=""/>
+        <p:cNvGrpSpPr/>
+        <p:nvPr/>
+      </p:nvGrpSpPr>
+      <p:grpSpPr>
+        <a:xfrm>
+          <a:off x="0" y="0"/>
+          <a:ext cx="0" cy="0"/>
+          <a:chOff x="0" y="0"/>
+          <a:chExt cx="0" cy="0"/>
+        </a:xfrm>
+      </p:grpSpPr>
+      <p:sp>
+        <p:nvSpPr>
+          <p:cNvPr id="6" name="Título 1">
+            <a:extLst>
+              <a:ext uri="{FF2B5EF4-FFF2-40B4-BE49-F238E27FC236}">
+                <a16:creationId xmlns:a16="http://schemas.microsoft.com/office/drawing/2014/main" id="{29506E41-E78A-4624-9442-2C05FCDFFDD1}"/>
+              </a:ext>
+            </a:extLst>
+          </p:cNvPr>
+          <p:cNvSpPr txBox="1">
+            <a:spLocks/>
+          </p:cNvSpPr>
+          <p:nvPr/>
+        </p:nvSpPr>
+        <p:spPr>
+          <a:xfrm>
+            <a:off x="815196" y="1886574"/>
+            <a:ext cx="10256807" cy="2780051"/>
+          </a:xfrm>
+          <a:prstGeom prst="rect">
+            <a:avLst/>
+          </a:prstGeom>
+        </p:spPr>
+        <p:txBody>
+          <a:bodyPr vert="horz" lIns="91440" tIns="45720" rIns="91440" bIns="45720" rtlCol="0" anchor="ctr">
+            <a:normAutofit fontScale="97500"/>
+          </a:bodyPr>
+          <a:lstStyle>
+            <a:lvl1pPr algn="l" defTabSz="914400" rtl="0" eaLnBrk="1" latinLnBrk="0" hangingPunct="1">
+              <a:lnSpc>
+                <a:spcPct val="90000"/>
+              </a:lnSpc>
+              <a:spcBef>
+                <a:spcPct val="0"/>
+              </a:spcBef>
+              <a:buNone/>
+              <a:defRPr sz="4400" kern="1200">
+                <a:solidFill>
+                  <a:schemeClr val="tx1"/>
+                </a:solidFill>
+                <a:latin typeface="+mj-lt"/>
+                <a:ea typeface="+mj-ea"/>
+                <a:cs typeface="+mj-cs"/>
+              </a:defRPr>
+            </a:lvl1pPr>
+          </a:lstStyle>
+          <a:p>
+            <a:pPr algn="r"/>
+            <a:r>
+              <a:rPr lang="en-US" sz="4800" b="1" dirty="0">
+                <a:solidFill>
+                  <a:srgbClr val="22438A"/>
+                </a:solidFill>
+                <a:latin typeface="Asap" panose="00000500000000000000"/>
+              </a:rPr>
+              <a:t>H</a:t>
+            </a:r>
+            <a:r>
+              <a:rPr lang="pt-BR" sz="4800" b="1" dirty="0">
+                <a:solidFill>
+                  <a:srgbClr val="22438A"/>
+                </a:solidFill>
+                <a:latin typeface="Asap" panose="00000500000000000000"/>
+              </a:rPr>
+              <a:t>ORA DE POR A MÃO NA MASSA !</a:t>
+            </a:r>
+          </a:p>
+          <a:p>
+            <a:pPr algn="r"/>
+            <a:r>
+              <a:rPr lang="pt-BR" sz="4800" b="1" dirty="0">
+                <a:solidFill>
+                  <a:srgbClr val="22438A"/>
+                </a:solidFill>
+                <a:latin typeface="Asap" panose="00000500000000000000"/>
+              </a:rPr>
+              <a:t>SHOW ME THE CODE  </a:t>
+            </a:r>
+          </a:p>
+        </p:txBody>
+      </p:sp>
+      <p:sp>
+        <p:nvSpPr>
+          <p:cNvPr id="5" name="Espaço Reservado para Conteúdo 2">
+            <a:extLst>
+              <a:ext uri="{FF2B5EF4-FFF2-40B4-BE49-F238E27FC236}">
+                <a16:creationId xmlns:a16="http://schemas.microsoft.com/office/drawing/2014/main" id="{298CF56C-531D-456B-926E-E1934EBBFA79}"/>
+              </a:ext>
+            </a:extLst>
+          </p:cNvPr>
+          <p:cNvSpPr txBox="1">
+            <a:spLocks/>
+          </p:cNvSpPr>
+          <p:nvPr/>
+        </p:nvSpPr>
+        <p:spPr>
+          <a:xfrm>
+            <a:off x="3885176" y="1430000"/>
+            <a:ext cx="7350904" cy="4403272"/>
+          </a:xfrm>
+          <a:prstGeom prst="rect">
+            <a:avLst/>
+          </a:prstGeom>
+        </p:spPr>
+        <p:txBody>
+          <a:bodyPr vert="horz" lIns="91440" tIns="45720" rIns="91440" bIns="45720" rtlCol="0">
+            <a:normAutofit/>
+          </a:bodyPr>
+          <a:lstStyle>
+            <a:lvl1pPr marL="228600" indent="-228600" algn="l" defTabSz="914400" rtl="0" eaLnBrk="1" latinLnBrk="0" hangingPunct="1">
+              <a:lnSpc>
+                <a:spcPct val="90000"/>
+              </a:lnSpc>
+              <a:spcBef>
+                <a:spcPts val="1000"/>
+              </a:spcBef>
+              <a:buFont typeface="Arial" panose="020B0604020202020204" pitchFamily="34" charset="0"/>
+              <a:buChar char="•"/>
+              <a:defRPr sz="2800" kern="1200">
+                <a:solidFill>
+                  <a:schemeClr val="tx1"/>
+                </a:solidFill>
+                <a:latin typeface="+mn-lt"/>
+                <a:ea typeface="+mn-ea"/>
+                <a:cs typeface="+mn-cs"/>
+              </a:defRPr>
+            </a:lvl1pPr>
+            <a:lvl2pPr marL="685800" indent="-228600" algn="l" defTabSz="914400" rtl="0" eaLnBrk="1" latinLnBrk="0" hangingPunct="1">
+              <a:lnSpc>
+                <a:spcPct val="90000"/>
+              </a:lnSpc>
+              <a:spcBef>
+                <a:spcPts val="500"/>
+              </a:spcBef>
+              <a:buFont typeface="Arial" panose="020B0604020202020204" pitchFamily="34" charset="0"/>
+              <a:buChar char="•"/>
+              <a:defRPr sz="2400" kern="1200">
+                <a:solidFill>
+                  <a:schemeClr val="tx1"/>
+                </a:solidFill>
+                <a:latin typeface="+mn-lt"/>
+                <a:ea typeface="+mn-ea"/>
+                <a:cs typeface="+mn-cs"/>
+              </a:defRPr>
+            </a:lvl2pPr>
+            <a:lvl3pPr marL="1143000" indent="-228600" algn="l" defTabSz="914400" rtl="0" eaLnBrk="1" latinLnBrk="0" hangingPunct="1">
+              <a:lnSpc>
+                <a:spcPct val="90000"/>
+              </a:lnSpc>
+              <a:spcBef>
+                <a:spcPts val="500"/>
+              </a:spcBef>
+              <a:buFont typeface="Arial" panose="020B0604020202020204" pitchFamily="34" charset="0"/>
+              <a:buChar char="•"/>
+              <a:defRPr sz="2000" kern="1200">
+                <a:solidFill>
+                  <a:schemeClr val="tx1"/>
+                </a:solidFill>
+                <a:latin typeface="+mn-lt"/>
+                <a:ea typeface="+mn-ea"/>
+                <a:cs typeface="+mn-cs"/>
+              </a:defRPr>
+            </a:lvl3pPr>
+            <a:lvl4pPr marL="1600200" indent="-228600" algn="l" defTabSz="914400" rtl="0" eaLnBrk="1" latinLnBrk="0" hangingPunct="1">
+              <a:lnSpc>
+                <a:spcPct val="90000"/>
+              </a:lnSpc>
+              <a:spcBef>
+                <a:spcPts val="500"/>
+              </a:spcBef>
+              <a:buFont typeface="Arial" panose="020B0604020202020204" pitchFamily="34" charset="0"/>
+              <a:buChar char="•"/>
+              <a:defRPr sz="1800" kern="1200">
+                <a:solidFill>
+                  <a:schemeClr val="tx1"/>
+                </a:solidFill>
+                <a:latin typeface="+mn-lt"/>
+                <a:ea typeface="+mn-ea"/>
+                <a:cs typeface="+mn-cs"/>
+              </a:defRPr>
+            </a:lvl4pPr>
+            <a:lvl5pPr marL="2057400" indent="-228600" algn="l" defTabSz="914400" rtl="0" eaLnBrk="1" latinLnBrk="0" hangingPunct="1">
+              <a:lnSpc>
+                <a:spcPct val="90000"/>
+              </a:lnSpc>
+              <a:spcBef>
+                <a:spcPts val="500"/>
+              </a:spcBef>
+              <a:buFont typeface="Arial" panose="020B0604020202020204" pitchFamily="34" charset="0"/>
+              <a:buChar char="•"/>
+              <a:defRPr sz="1800" kern="1200">
+                <a:solidFill>
+                  <a:schemeClr val="tx1"/>
+                </a:solidFill>
+                <a:latin typeface="+mn-lt"/>
+                <a:ea typeface="+mn-ea"/>
+                <a:cs typeface="+mn-cs"/>
+              </a:defRPr>
+            </a:lvl5pPr>
+            <a:lvl6pPr marL="2514600" indent="-228600" algn="l" defTabSz="914400" rtl="0" eaLnBrk="1" latinLnBrk="0" hangingPunct="1">
+              <a:lnSpc>
+                <a:spcPct val="90000"/>
+              </a:lnSpc>
+              <a:spcBef>
+                <a:spcPts val="500"/>
+              </a:spcBef>
+              <a:buFont typeface="Arial" panose="020B0604020202020204" pitchFamily="34" charset="0"/>
+              <a:buChar char="•"/>
+              <a:defRPr sz="1800" kern="1200">
+                <a:solidFill>
+                  <a:schemeClr val="tx1"/>
+                </a:solidFill>
+                <a:latin typeface="+mn-lt"/>
+                <a:ea typeface="+mn-ea"/>
+                <a:cs typeface="+mn-cs"/>
+              </a:defRPr>
+            </a:lvl6pPr>
+            <a:lvl7pPr marL="2971800" indent="-228600" algn="l" defTabSz="914400" rtl="0" eaLnBrk="1" latinLnBrk="0" hangingPunct="1">
+              <a:lnSpc>
+                <a:spcPct val="90000"/>
+              </a:lnSpc>
+              <a:spcBef>
+                <a:spcPts val="500"/>
+              </a:spcBef>
+              <a:buFont typeface="Arial" panose="020B0604020202020204" pitchFamily="34" charset="0"/>
+              <a:buChar char="•"/>
+              <a:defRPr sz="1800" kern="1200">
+                <a:solidFill>
+                  <a:schemeClr val="tx1"/>
+                </a:solidFill>
+                <a:latin typeface="+mn-lt"/>
+                <a:ea typeface="+mn-ea"/>
+                <a:cs typeface="+mn-cs"/>
+              </a:defRPr>
+            </a:lvl7pPr>
+            <a:lvl8pPr marL="3429000" indent="-228600" algn="l" defTabSz="914400" rtl="0" eaLnBrk="1" latinLnBrk="0" hangingPunct="1">
+              <a:lnSpc>
+                <a:spcPct val="90000"/>
+              </a:lnSpc>
+              <a:spcBef>
+                <a:spcPts val="500"/>
+              </a:spcBef>
+              <a:buFont typeface="Arial" panose="020B0604020202020204" pitchFamily="34" charset="0"/>
+              <a:buChar char="•"/>
+              <a:defRPr sz="1800" kern="1200">
+                <a:solidFill>
+                  <a:schemeClr val="tx1"/>
+                </a:solidFill>
+                <a:latin typeface="+mn-lt"/>
+                <a:ea typeface="+mn-ea"/>
+                <a:cs typeface="+mn-cs"/>
+              </a:defRPr>
+            </a:lvl8pPr>
+            <a:lvl9pPr marL="3886200" indent="-228600" algn="l" defTabSz="914400" rtl="0" eaLnBrk="1" latinLnBrk="0" hangingPunct="1">
+              <a:lnSpc>
+                <a:spcPct val="90000"/>
+              </a:lnSpc>
+              <a:spcBef>
+                <a:spcPts val="500"/>
+              </a:spcBef>
+              <a:buFont typeface="Arial" panose="020B0604020202020204" pitchFamily="34" charset="0"/>
+              <a:buChar char="•"/>
+              <a:defRPr sz="1800" kern="1200">
+                <a:solidFill>
+                  <a:schemeClr val="tx1"/>
+                </a:solidFill>
+                <a:latin typeface="+mn-lt"/>
+                <a:ea typeface="+mn-ea"/>
+                <a:cs typeface="+mn-cs"/>
+              </a:defRPr>
+            </a:lvl9pPr>
+          </a:lstStyle>
+          <a:p>
+            <a:pPr marL="0" indent="0">
+              <a:lnSpc>
+                <a:spcPct val="100000"/>
+              </a:lnSpc>
+              <a:buFont typeface="Arial" panose="020B0604020202020204" pitchFamily="34" charset="0"/>
+              <a:buNone/>
+            </a:pPr>
+            <a:r>
+              <a:rPr lang="pt-BR" sz="2600" dirty="0">
+                <a:solidFill>
+                  <a:srgbClr val="575756"/>
+                </a:solidFill>
+                <a:latin typeface="Asap" panose="00000500000000000000" pitchFamily="2" charset="0"/>
+              </a:rPr>
+              <a:t> </a:t>
+            </a:r>
+          </a:p>
+        </p:txBody>
+      </p:sp>
+      <p:sp>
+        <p:nvSpPr>
+          <p:cNvPr id="2" name="AutoShape 2" descr="Diagram of bounded contexts">
+            <a:extLst>
+              <a:ext uri="{FF2B5EF4-FFF2-40B4-BE49-F238E27FC236}">
+                <a16:creationId xmlns:a16="http://schemas.microsoft.com/office/drawing/2014/main" id="{F19AE2D8-9601-3870-93B4-3B01BF93D535}"/>
+              </a:ext>
+            </a:extLst>
+          </p:cNvPr>
+          <p:cNvSpPr>
+            <a:spLocks noChangeAspect="1" noChangeArrowheads="1"/>
+          </p:cNvSpPr>
+          <p:nvPr/>
+        </p:nvSpPr>
+        <p:spPr bwMode="auto">
+          <a:xfrm>
+            <a:off x="5943600" y="3276600"/>
+            <a:ext cx="304800" cy="304800"/>
+          </a:xfrm>
+          <a:prstGeom prst="rect">
+            <a:avLst/>
+          </a:prstGeom>
+          <a:noFill/>
+          <a:extLst>
+            <a:ext uri="{909E8E84-426E-40DD-AFC4-6F175D3DCCD1}">
+              <a14:hiddenFill xmlns:a14="http://schemas.microsoft.com/office/drawing/2010/main">
+                <a:solidFill>
+                  <a:srgbClr val="FFFFFF"/>
+                </a:solidFill>
+              </a14:hiddenFill>
+            </a:ext>
+          </a:extLst>
+        </p:spPr>
+        <p:txBody>
+          <a:bodyPr vert="horz" wrap="square" lIns="91440" tIns="45720" rIns="91440" bIns="45720" numCol="1" anchor="t" anchorCtr="0" compatLnSpc="1">
+            <a:prstTxWarp prst="textNoShape">
+              <a:avLst/>
+            </a:prstTxWarp>
+          </a:bodyPr>
+          <a:lstStyle/>
+          <a:p>
+            <a:endParaRPr lang="pt-BR"/>
+          </a:p>
+        </p:txBody>
+      </p:sp>
+    </p:spTree>
+    <p:extLst>
+      <p:ext uri="{BB962C8B-B14F-4D97-AF65-F5344CB8AC3E}">
+        <p14:creationId xmlns:p14="http://schemas.microsoft.com/office/powerpoint/2010/main" val="4217117064"/>
       </p:ext>
     </p:extLst>
   </p:cSld>

</xml_diff>